<commit_message>
Module 8 assignment 4 updated
Fixed typo in title slide. Changed Assignment number from "3" to "4"
</commit_message>
<xml_diff>
--- a/module_8_access_management_and_monitoring_services/module_8_assignment_4_cloudwatch/module_8_assignment_4.pptx
+++ b/module_8_access_management_and_monitoring_services/module_8_assignment_4_cloudwatch/module_8_assignment_4.pptx
@@ -3045,7 +3045,7 @@
         <p:spPr>
           <a:xfrm>
             <a:off x="504000" y="226080"/>
-            <a:ext cx="9070920" cy="945720"/>
+            <a:ext cx="9072000" cy="946440"/>
           </a:xfrm>
           <a:prstGeom prst="rect">
             <a:avLst/>
@@ -3060,91 +3060,14 @@
             <a:noAutofit/>
           </a:bodyPr>
           <a:p>
+            <a:pPr algn="ctr"/>
             <a:r>
-              <a:rPr b="0" lang="en-IN" sz="1800" spc="-1" strike="noStrike">
+              <a:rPr b="0" lang="en-IN" sz="4400" spc="-1" strike="noStrike">
                 <a:latin typeface="Arial"/>
               </a:rPr>
-              <a:t>Cli</a:t>
+              <a:t>Click to edit the title text format</a:t>
             </a:r>
-            <a:r>
-              <a:rPr b="0" lang="en-IN" sz="1800" spc="-1" strike="noStrike">
-                <a:latin typeface="Arial"/>
-              </a:rPr>
-              <a:t>ck </a:t>
-            </a:r>
-            <a:r>
-              <a:rPr b="0" lang="en-IN" sz="1800" spc="-1" strike="noStrike">
-                <a:latin typeface="Arial"/>
-              </a:rPr>
-              <a:t>to </a:t>
-            </a:r>
-            <a:r>
-              <a:rPr b="0" lang="en-IN" sz="1800" spc="-1" strike="noStrike">
-                <a:latin typeface="Arial"/>
-              </a:rPr>
-              <a:t>ed</a:t>
-            </a:r>
-            <a:r>
-              <a:rPr b="0" lang="en-IN" sz="1800" spc="-1" strike="noStrike">
-                <a:latin typeface="Arial"/>
-              </a:rPr>
-              <a:t>it </a:t>
-            </a:r>
-            <a:r>
-              <a:rPr b="0" lang="en-IN" sz="1800" spc="-1" strike="noStrike">
-                <a:latin typeface="Arial"/>
-              </a:rPr>
-              <a:t>th</a:t>
-            </a:r>
-            <a:r>
-              <a:rPr b="0" lang="en-IN" sz="1800" spc="-1" strike="noStrike">
-                <a:latin typeface="Arial"/>
-              </a:rPr>
-              <a:t>e </a:t>
-            </a:r>
-            <a:r>
-              <a:rPr b="0" lang="en-IN" sz="1800" spc="-1" strike="noStrike">
-                <a:latin typeface="Arial"/>
-              </a:rPr>
-              <a:t>titl</a:t>
-            </a:r>
-            <a:r>
-              <a:rPr b="0" lang="en-IN" sz="1800" spc="-1" strike="noStrike">
-                <a:latin typeface="Arial"/>
-              </a:rPr>
-              <a:t>e </a:t>
-            </a:r>
-            <a:r>
-              <a:rPr b="0" lang="en-IN" sz="1800" spc="-1" strike="noStrike">
-                <a:latin typeface="Arial"/>
-              </a:rPr>
-              <a:t>te</a:t>
-            </a:r>
-            <a:r>
-              <a:rPr b="0" lang="en-IN" sz="1800" spc="-1" strike="noStrike">
-                <a:latin typeface="Arial"/>
-              </a:rPr>
-              <a:t>xt </a:t>
-            </a:r>
-            <a:r>
-              <a:rPr b="0" lang="en-IN" sz="1800" spc="-1" strike="noStrike">
-                <a:latin typeface="Arial"/>
-              </a:rPr>
-              <a:t>for</a:t>
-            </a:r>
-            <a:r>
-              <a:rPr b="0" lang="en-IN" sz="1800" spc="-1" strike="noStrike">
-                <a:latin typeface="Arial"/>
-              </a:rPr>
-              <a:t>m</a:t>
-            </a:r>
-            <a:r>
-              <a:rPr b="0" lang="en-IN" sz="1800" spc="-1" strike="noStrike">
-                <a:latin typeface="Arial"/>
-              </a:rPr>
-              <a:t>at</a:t>
-            </a:r>
-            <a:endParaRPr b="0" lang="en-IN" sz="1800" spc="-1" strike="noStrike">
+            <a:endParaRPr b="0" lang="en-IN" sz="4400" spc="-1" strike="noStrike">
               <a:latin typeface="Arial"/>
             </a:endParaRPr>
           </a:p>
@@ -3163,7 +3086,7 @@
         <p:spPr>
           <a:xfrm>
             <a:off x="504000" y="1326600"/>
-            <a:ext cx="9070920" cy="3287520"/>
+            <a:ext cx="9072000" cy="3288600"/>
           </a:xfrm>
           <a:prstGeom prst="rect">
             <a:avLst/>
@@ -3190,12 +3113,12 @@
               <a:buChar char=""/>
             </a:pPr>
             <a:r>
-              <a:rPr b="0" lang="en-IN" sz="1800" spc="-1" strike="noStrike">
+              <a:rPr b="0" lang="en-IN" sz="3200" spc="-1" strike="noStrike">
                 <a:latin typeface="Arial"/>
               </a:rPr>
               <a:t>Click to edit the outline text format</a:t>
             </a:r>
-            <a:endParaRPr b="0" lang="en-IN" sz="1800" spc="-1" strike="noStrike">
+            <a:endParaRPr b="0" lang="en-IN" sz="3200" spc="-1" strike="noStrike">
               <a:latin typeface="Arial"/>
             </a:endParaRPr>
           </a:p>
@@ -3212,12 +3135,12 @@
               <a:buChar char=""/>
             </a:pPr>
             <a:r>
-              <a:rPr b="0" lang="en-IN" sz="1800" spc="-1" strike="noStrike">
+              <a:rPr b="0" lang="en-IN" sz="2800" spc="-1" strike="noStrike">
                 <a:latin typeface="Arial"/>
               </a:rPr>
               <a:t>Second Outline Level</a:t>
             </a:r>
-            <a:endParaRPr b="0" lang="en-IN" sz="1800" spc="-1" strike="noStrike">
+            <a:endParaRPr b="0" lang="en-IN" sz="2800" spc="-1" strike="noStrike">
               <a:latin typeface="Arial"/>
             </a:endParaRPr>
           </a:p>
@@ -3234,12 +3157,12 @@
               <a:buChar char=""/>
             </a:pPr>
             <a:r>
-              <a:rPr b="0" lang="en-IN" sz="1800" spc="-1" strike="noStrike">
+              <a:rPr b="0" lang="en-IN" sz="2400" spc="-1" strike="noStrike">
                 <a:latin typeface="Arial"/>
               </a:rPr>
               <a:t>Third Outline Level</a:t>
             </a:r>
-            <a:endParaRPr b="0" lang="en-IN" sz="1800" spc="-1" strike="noStrike">
+            <a:endParaRPr b="0" lang="en-IN" sz="2400" spc="-1" strike="noStrike">
               <a:latin typeface="Arial"/>
             </a:endParaRPr>
           </a:p>
@@ -3256,12 +3179,12 @@
               <a:buChar char=""/>
             </a:pPr>
             <a:r>
-              <a:rPr b="0" lang="en-IN" sz="1800" spc="-1" strike="noStrike">
+              <a:rPr b="0" lang="en-IN" sz="2000" spc="-1" strike="noStrike">
                 <a:latin typeface="Arial"/>
               </a:rPr>
               <a:t>Fourth Outline Level</a:t>
             </a:r>
-            <a:endParaRPr b="0" lang="en-IN" sz="1800" spc="-1" strike="noStrike">
+            <a:endParaRPr b="0" lang="en-IN" sz="2000" spc="-1" strike="noStrike">
               <a:latin typeface="Arial"/>
             </a:endParaRPr>
           </a:p>
@@ -3278,12 +3201,12 @@
               <a:buChar char=""/>
             </a:pPr>
             <a:r>
-              <a:rPr b="0" lang="en-IN" sz="1800" spc="-1" strike="noStrike">
+              <a:rPr b="0" lang="en-IN" sz="2000" spc="-1" strike="noStrike">
                 <a:latin typeface="Arial"/>
               </a:rPr>
               <a:t>Fifth Outline Level</a:t>
             </a:r>
-            <a:endParaRPr b="0" lang="en-IN" sz="1800" spc="-1" strike="noStrike">
+            <a:endParaRPr b="0" lang="en-IN" sz="2000" spc="-1" strike="noStrike">
               <a:latin typeface="Arial"/>
             </a:endParaRPr>
           </a:p>
@@ -3300,12 +3223,12 @@
               <a:buChar char=""/>
             </a:pPr>
             <a:r>
-              <a:rPr b="0" lang="en-IN" sz="1800" spc="-1" strike="noStrike">
+              <a:rPr b="0" lang="en-IN" sz="2000" spc="-1" strike="noStrike">
                 <a:latin typeface="Arial"/>
               </a:rPr>
               <a:t>Sixth Outline Level</a:t>
             </a:r>
-            <a:endParaRPr b="0" lang="en-IN" sz="1800" spc="-1" strike="noStrike">
+            <a:endParaRPr b="0" lang="en-IN" sz="2000" spc="-1" strike="noStrike">
               <a:latin typeface="Arial"/>
             </a:endParaRPr>
           </a:p>
@@ -3322,12 +3245,12 @@
               <a:buChar char=""/>
             </a:pPr>
             <a:r>
-              <a:rPr b="0" lang="en-IN" sz="1800" spc="-1" strike="noStrike">
+              <a:rPr b="0" lang="en-IN" sz="2000" spc="-1" strike="noStrike">
                 <a:latin typeface="Arial"/>
               </a:rPr>
               <a:t>Seventh Outline Level</a:t>
             </a:r>
-            <a:endParaRPr b="0" lang="en-IN" sz="1800" spc="-1" strike="noStrike">
+            <a:endParaRPr b="0" lang="en-IN" sz="2000" spc="-1" strike="noStrike">
               <a:latin typeface="Arial"/>
             </a:endParaRPr>
           </a:p>
@@ -3644,7 +3567,7 @@
         <p:spPr>
           <a:xfrm>
             <a:off x="504000" y="226080"/>
-            <a:ext cx="9070920" cy="945720"/>
+            <a:ext cx="9070560" cy="945360"/>
           </a:xfrm>
           <a:prstGeom prst="rect">
             <a:avLst/>
@@ -3671,259 +3594,7 @@
                 </a:solidFill>
                 <a:latin typeface="Arial"/>
               </a:rPr>
-              <a:t>M</a:t>
-            </a:r>
-            <a:r>
-              <a:rPr b="0" lang="en-IN" sz="4000" spc="-1" strike="noStrike">
-                <a:solidFill>
-                  <a:srgbClr val="2a6099"/>
-                </a:solidFill>
-                <a:latin typeface="Arial"/>
-              </a:rPr>
-              <a:t>o</a:t>
-            </a:r>
-            <a:r>
-              <a:rPr b="0" lang="en-IN" sz="4000" spc="-1" strike="noStrike">
-                <a:solidFill>
-                  <a:srgbClr val="2a6099"/>
-                </a:solidFill>
-                <a:latin typeface="Arial"/>
-              </a:rPr>
-              <a:t>d</a:t>
-            </a:r>
-            <a:r>
-              <a:rPr b="0" lang="en-IN" sz="4000" spc="-1" strike="noStrike">
-                <a:solidFill>
-                  <a:srgbClr val="2a6099"/>
-                </a:solidFill>
-                <a:latin typeface="Arial"/>
-              </a:rPr>
-              <a:t>u</a:t>
-            </a:r>
-            <a:r>
-              <a:rPr b="0" lang="en-IN" sz="4000" spc="-1" strike="noStrike">
-                <a:solidFill>
-                  <a:srgbClr val="2a6099"/>
-                </a:solidFill>
-                <a:latin typeface="Arial"/>
-              </a:rPr>
-              <a:t>l</a:t>
-            </a:r>
-            <a:r>
-              <a:rPr b="0" lang="en-IN" sz="4000" spc="-1" strike="noStrike">
-                <a:solidFill>
-                  <a:srgbClr val="2a6099"/>
-                </a:solidFill>
-                <a:latin typeface="Arial"/>
-              </a:rPr>
-              <a:t>e </a:t>
-            </a:r>
-            <a:r>
-              <a:rPr b="0" lang="en-IN" sz="4000" spc="-1" strike="noStrike">
-                <a:solidFill>
-                  <a:srgbClr val="2a6099"/>
-                </a:solidFill>
-                <a:latin typeface="Arial"/>
-              </a:rPr>
-              <a:t>8 </a:t>
-            </a:r>
-            <a:r>
-              <a:rPr b="0" lang="en-IN" sz="4000" spc="-1" strike="noStrike">
-                <a:solidFill>
-                  <a:srgbClr val="2a6099"/>
-                </a:solidFill>
-                <a:latin typeface="Arial"/>
-              </a:rPr>
-              <a:t>A</a:t>
-            </a:r>
-            <a:r>
-              <a:rPr b="0" lang="en-IN" sz="4000" spc="-1" strike="noStrike">
-                <a:solidFill>
-                  <a:srgbClr val="2a6099"/>
-                </a:solidFill>
-                <a:latin typeface="Arial"/>
-              </a:rPr>
-              <a:t>s</a:t>
-            </a:r>
-            <a:r>
-              <a:rPr b="0" lang="en-IN" sz="4000" spc="-1" strike="noStrike">
-                <a:solidFill>
-                  <a:srgbClr val="2a6099"/>
-                </a:solidFill>
-                <a:latin typeface="Arial"/>
-              </a:rPr>
-              <a:t>s</a:t>
-            </a:r>
-            <a:r>
-              <a:rPr b="0" lang="en-IN" sz="4000" spc="-1" strike="noStrike">
-                <a:solidFill>
-                  <a:srgbClr val="2a6099"/>
-                </a:solidFill>
-                <a:latin typeface="Arial"/>
-              </a:rPr>
-              <a:t>i</a:t>
-            </a:r>
-            <a:r>
-              <a:rPr b="0" lang="en-IN" sz="4000" spc="-1" strike="noStrike">
-                <a:solidFill>
-                  <a:srgbClr val="2a6099"/>
-                </a:solidFill>
-                <a:latin typeface="Arial"/>
-              </a:rPr>
-              <a:t>g</a:t>
-            </a:r>
-            <a:r>
-              <a:rPr b="0" lang="en-IN" sz="4000" spc="-1" strike="noStrike">
-                <a:solidFill>
-                  <a:srgbClr val="2a6099"/>
-                </a:solidFill>
-                <a:latin typeface="Arial"/>
-              </a:rPr>
-              <a:t>n</a:t>
-            </a:r>
-            <a:r>
-              <a:rPr b="0" lang="en-IN" sz="4000" spc="-1" strike="noStrike">
-                <a:solidFill>
-                  <a:srgbClr val="2a6099"/>
-                </a:solidFill>
-                <a:latin typeface="Arial"/>
-              </a:rPr>
-              <a:t>m</a:t>
-            </a:r>
-            <a:r>
-              <a:rPr b="0" lang="en-IN" sz="4000" spc="-1" strike="noStrike">
-                <a:solidFill>
-                  <a:srgbClr val="2a6099"/>
-                </a:solidFill>
-                <a:latin typeface="Arial"/>
-              </a:rPr>
-              <a:t>e</a:t>
-            </a:r>
-            <a:r>
-              <a:rPr b="0" lang="en-IN" sz="4000" spc="-1" strike="noStrike">
-                <a:solidFill>
-                  <a:srgbClr val="2a6099"/>
-                </a:solidFill>
-                <a:latin typeface="Arial"/>
-              </a:rPr>
-              <a:t>n</a:t>
-            </a:r>
-            <a:r>
-              <a:rPr b="0" lang="en-IN" sz="4000" spc="-1" strike="noStrike">
-                <a:solidFill>
-                  <a:srgbClr val="2a6099"/>
-                </a:solidFill>
-                <a:latin typeface="Arial"/>
-              </a:rPr>
-              <a:t>t </a:t>
-            </a:r>
-            <a:r>
-              <a:rPr b="0" lang="en-IN" sz="4000" spc="-1" strike="noStrike">
-                <a:solidFill>
-                  <a:srgbClr val="2a6099"/>
-                </a:solidFill>
-                <a:latin typeface="Arial"/>
-              </a:rPr>
-              <a:t>3 </a:t>
-            </a:r>
-            <a:r>
-              <a:rPr b="0" lang="en-IN" sz="4000" spc="-1" strike="noStrike">
-                <a:solidFill>
-                  <a:srgbClr val="2a6099"/>
-                </a:solidFill>
-                <a:latin typeface="Arial"/>
-              </a:rPr>
-              <a:t>- </a:t>
-            </a:r>
-            <a:r>
-              <a:rPr b="0" lang="en-IN" sz="4000" spc="-1" strike="noStrike">
-                <a:solidFill>
-                  <a:srgbClr val="2a6099"/>
-                </a:solidFill>
-                <a:latin typeface="Arial"/>
-              </a:rPr>
-              <a:t>C</a:t>
-            </a:r>
-            <a:r>
-              <a:rPr b="0" lang="en-IN" sz="4000" spc="-1" strike="noStrike">
-                <a:solidFill>
-                  <a:srgbClr val="2a6099"/>
-                </a:solidFill>
-                <a:latin typeface="Arial"/>
-              </a:rPr>
-              <a:t>l</a:t>
-            </a:r>
-            <a:r>
-              <a:rPr b="0" lang="en-IN" sz="4000" spc="-1" strike="noStrike">
-                <a:solidFill>
-                  <a:srgbClr val="2a6099"/>
-                </a:solidFill>
-                <a:latin typeface="Arial"/>
-              </a:rPr>
-              <a:t>o</a:t>
-            </a:r>
-            <a:r>
-              <a:rPr b="0" lang="en-IN" sz="4000" spc="-1" strike="noStrike">
-                <a:solidFill>
-                  <a:srgbClr val="2a6099"/>
-                </a:solidFill>
-                <a:latin typeface="Arial"/>
-              </a:rPr>
-              <a:t>u</a:t>
-            </a:r>
-            <a:r>
-              <a:rPr b="0" lang="en-IN" sz="4000" spc="-1" strike="noStrike">
-                <a:solidFill>
-                  <a:srgbClr val="2a6099"/>
-                </a:solidFill>
-                <a:latin typeface="Arial"/>
-              </a:rPr>
-              <a:t>d</a:t>
-            </a:r>
-            <a:r>
-              <a:rPr b="0" lang="en-IN" sz="4000" spc="-1" strike="noStrike">
-                <a:solidFill>
-                  <a:srgbClr val="2a6099"/>
-                </a:solidFill>
-                <a:latin typeface="Arial"/>
-              </a:rPr>
-              <a:t>W</a:t>
-            </a:r>
-            <a:r>
-              <a:rPr b="0" lang="en-IN" sz="4000" spc="-1" strike="noStrike">
-                <a:solidFill>
-                  <a:srgbClr val="2a6099"/>
-                </a:solidFill>
-                <a:latin typeface="Arial"/>
-              </a:rPr>
-              <a:t>a</a:t>
-            </a:r>
-            <a:r>
-              <a:rPr b="0" lang="en-IN" sz="4000" spc="-1" strike="noStrike">
-                <a:solidFill>
-                  <a:srgbClr val="2a6099"/>
-                </a:solidFill>
-                <a:latin typeface="Arial"/>
-              </a:rPr>
-              <a:t>t</a:t>
-            </a:r>
-            <a:r>
-              <a:rPr b="0" lang="en-IN" sz="4000" spc="-1" strike="noStrike">
-                <a:solidFill>
-                  <a:srgbClr val="2a6099"/>
-                </a:solidFill>
-                <a:latin typeface="Arial"/>
-              </a:rPr>
-              <a:t>c</a:t>
-            </a:r>
-            <a:r>
-              <a:rPr b="0" lang="en-IN" sz="4000" spc="-1" strike="noStrike">
-                <a:solidFill>
-                  <a:srgbClr val="2a6099"/>
-                </a:solidFill>
-                <a:latin typeface="Arial"/>
-              </a:rPr>
-              <a:t>h</a:t>
+              <a:t>Module 8 Assignment 4 - CloudWatch</a:t>
             </a:r>
             <a:endParaRPr b="0" lang="en-IN" sz="4000" spc="-1" strike="noStrike">
               <a:latin typeface="Arial"/>
@@ -3944,7 +3615,7 @@
         <p:spPr>
           <a:xfrm>
             <a:off x="504000" y="1326600"/>
-            <a:ext cx="9070920" cy="3287520"/>
+            <a:ext cx="9070560" cy="3287160"/>
           </a:xfrm>
           <a:prstGeom prst="rect">
             <a:avLst/>
@@ -3971,169 +3642,7 @@
                 </a:solidFill>
                 <a:latin typeface="Arial"/>
               </a:rPr>
-              <a:t>Y</a:t>
-            </a:r>
-            <a:r>
-              <a:rPr b="0" lang="en-IN" sz="2800" spc="-1" strike="noStrike">
-                <a:solidFill>
-                  <a:srgbClr val="2a6099"/>
-                </a:solidFill>
-                <a:latin typeface="Arial"/>
-              </a:rPr>
-              <a:t>o</a:t>
-            </a:r>
-            <a:r>
-              <a:rPr b="0" lang="en-IN" sz="2800" spc="-1" strike="noStrike">
-                <a:solidFill>
-                  <a:srgbClr val="2a6099"/>
-                </a:solidFill>
-                <a:latin typeface="Arial"/>
-              </a:rPr>
-              <a:t>u </a:t>
-            </a:r>
-            <a:r>
-              <a:rPr b="0" lang="en-IN" sz="2800" spc="-1" strike="noStrike">
-                <a:solidFill>
-                  <a:srgbClr val="2a6099"/>
-                </a:solidFill>
-                <a:latin typeface="Arial"/>
-              </a:rPr>
-              <a:t>h</a:t>
-            </a:r>
-            <a:r>
-              <a:rPr b="0" lang="en-IN" sz="2800" spc="-1" strike="noStrike">
-                <a:solidFill>
-                  <a:srgbClr val="2a6099"/>
-                </a:solidFill>
-                <a:latin typeface="Arial"/>
-              </a:rPr>
-              <a:t>a</a:t>
-            </a:r>
-            <a:r>
-              <a:rPr b="0" lang="en-IN" sz="2800" spc="-1" strike="noStrike">
-                <a:solidFill>
-                  <a:srgbClr val="2a6099"/>
-                </a:solidFill>
-                <a:latin typeface="Arial"/>
-              </a:rPr>
-              <a:t>v</a:t>
-            </a:r>
-            <a:r>
-              <a:rPr b="0" lang="en-IN" sz="2800" spc="-1" strike="noStrike">
-                <a:solidFill>
-                  <a:srgbClr val="2a6099"/>
-                </a:solidFill>
-                <a:latin typeface="Arial"/>
-              </a:rPr>
-              <a:t>e </a:t>
-            </a:r>
-            <a:r>
-              <a:rPr b="0" lang="en-IN" sz="2800" spc="-1" strike="noStrike">
-                <a:solidFill>
-                  <a:srgbClr val="2a6099"/>
-                </a:solidFill>
-                <a:latin typeface="Arial"/>
-              </a:rPr>
-              <a:t>b</a:t>
-            </a:r>
-            <a:r>
-              <a:rPr b="0" lang="en-IN" sz="2800" spc="-1" strike="noStrike">
-                <a:solidFill>
-                  <a:srgbClr val="2a6099"/>
-                </a:solidFill>
-                <a:latin typeface="Arial"/>
-              </a:rPr>
-              <a:t>e</a:t>
-            </a:r>
-            <a:r>
-              <a:rPr b="0" lang="en-IN" sz="2800" spc="-1" strike="noStrike">
-                <a:solidFill>
-                  <a:srgbClr val="2a6099"/>
-                </a:solidFill>
-                <a:latin typeface="Arial"/>
-              </a:rPr>
-              <a:t>e</a:t>
-            </a:r>
-            <a:r>
-              <a:rPr b="0" lang="en-IN" sz="2800" spc="-1" strike="noStrike">
-                <a:solidFill>
-                  <a:srgbClr val="2a6099"/>
-                </a:solidFill>
-                <a:latin typeface="Arial"/>
-              </a:rPr>
-              <a:t>n </a:t>
-            </a:r>
-            <a:r>
-              <a:rPr b="0" lang="en-IN" sz="2800" spc="-1" strike="noStrike">
-                <a:solidFill>
-                  <a:srgbClr val="2a6099"/>
-                </a:solidFill>
-                <a:latin typeface="Arial"/>
-              </a:rPr>
-              <a:t>a</a:t>
-            </a:r>
-            <a:r>
-              <a:rPr b="0" lang="en-IN" sz="2800" spc="-1" strike="noStrike">
-                <a:solidFill>
-                  <a:srgbClr val="2a6099"/>
-                </a:solidFill>
-                <a:latin typeface="Arial"/>
-              </a:rPr>
-              <a:t>s</a:t>
-            </a:r>
-            <a:r>
-              <a:rPr b="0" lang="en-IN" sz="2800" spc="-1" strike="noStrike">
-                <a:solidFill>
-                  <a:srgbClr val="2a6099"/>
-                </a:solidFill>
-                <a:latin typeface="Arial"/>
-              </a:rPr>
-              <a:t>k</a:t>
-            </a:r>
-            <a:r>
-              <a:rPr b="0" lang="en-IN" sz="2800" spc="-1" strike="noStrike">
-                <a:solidFill>
-                  <a:srgbClr val="2a6099"/>
-                </a:solidFill>
-                <a:latin typeface="Arial"/>
-              </a:rPr>
-              <a:t>e</a:t>
-            </a:r>
-            <a:r>
-              <a:rPr b="0" lang="en-IN" sz="2800" spc="-1" strike="noStrike">
-                <a:solidFill>
-                  <a:srgbClr val="2a6099"/>
-                </a:solidFill>
-                <a:latin typeface="Arial"/>
-              </a:rPr>
-              <a:t>d </a:t>
-            </a:r>
-            <a:r>
-              <a:rPr b="0" lang="en-IN" sz="2800" spc="-1" strike="noStrike">
-                <a:solidFill>
-                  <a:srgbClr val="2a6099"/>
-                </a:solidFill>
-                <a:latin typeface="Arial"/>
-              </a:rPr>
-              <a:t>t</a:t>
-            </a:r>
-            <a:r>
-              <a:rPr b="0" lang="en-IN" sz="2800" spc="-1" strike="noStrike">
-                <a:solidFill>
-                  <a:srgbClr val="2a6099"/>
-                </a:solidFill>
-                <a:latin typeface="Arial"/>
-              </a:rPr>
-              <a:t>o</a:t>
-            </a:r>
-            <a:r>
-              <a:rPr b="0" lang="en-IN" sz="2800" spc="-1" strike="noStrike">
-                <a:solidFill>
-                  <a:srgbClr val="2a6099"/>
-                </a:solidFill>
-                <a:latin typeface="Arial"/>
-              </a:rPr>
-              <a:t>:</a:t>
+              <a:t>You have been asked to:</a:t>
             </a:r>
             <a:endParaRPr b="0" lang="en-IN" sz="2800" spc="-1" strike="noStrike">
               <a:latin typeface="Arial"/>
@@ -4164,613 +3673,7 @@
               <a:rPr b="0" lang="en-IN" sz="2800" spc="-1" strike="noStrike">
                 <a:latin typeface="Arial"/>
               </a:rPr>
-              <a:t>C</a:t>
-            </a:r>
-            <a:r>
-              <a:rPr b="0" lang="en-IN" sz="2800" spc="-1" strike="noStrike">
-                <a:latin typeface="Arial"/>
-              </a:rPr>
-              <a:t>r</a:t>
-            </a:r>
-            <a:r>
-              <a:rPr b="0" lang="en-IN" sz="2800" spc="-1" strike="noStrike">
-                <a:latin typeface="Arial"/>
-              </a:rPr>
-              <a:t>e</a:t>
-            </a:r>
-            <a:r>
-              <a:rPr b="0" lang="en-IN" sz="2800" spc="-1" strike="noStrike">
-                <a:latin typeface="Arial"/>
-              </a:rPr>
-              <a:t>a</a:t>
-            </a:r>
-            <a:r>
-              <a:rPr b="0" lang="en-IN" sz="2800" spc="-1" strike="noStrike">
-                <a:latin typeface="Arial"/>
-              </a:rPr>
-              <a:t>t</a:t>
-            </a:r>
-            <a:r>
-              <a:rPr b="0" lang="en-IN" sz="2800" spc="-1" strike="noStrike">
-                <a:latin typeface="Arial"/>
-              </a:rPr>
-              <a:t>e</a:t>
-            </a:r>
-            <a:r>
-              <a:rPr b="0" lang="en-IN" sz="2800" spc="-1" strike="noStrike">
-                <a:latin typeface="Arial"/>
-              </a:rPr>
-              <a:t> </a:t>
-            </a:r>
-            <a:r>
-              <a:rPr b="0" lang="en-IN" sz="2800" spc="-1" strike="noStrike">
-                <a:latin typeface="Arial"/>
-              </a:rPr>
-              <a:t>a</a:t>
-            </a:r>
-            <a:r>
-              <a:rPr b="0" lang="en-IN" sz="2800" spc="-1" strike="noStrike">
-                <a:latin typeface="Arial"/>
-              </a:rPr>
-              <a:t> </a:t>
-            </a:r>
-            <a:r>
-              <a:rPr b="0" lang="en-IN" sz="2800" spc="-1" strike="noStrike">
-                <a:latin typeface="Arial"/>
-              </a:rPr>
-              <a:t>d</a:t>
-            </a:r>
-            <a:r>
-              <a:rPr b="0" lang="en-IN" sz="2800" spc="-1" strike="noStrike">
-                <a:latin typeface="Arial"/>
-              </a:rPr>
-              <a:t>a</a:t>
-            </a:r>
-            <a:r>
-              <a:rPr b="0" lang="en-IN" sz="2800" spc="-1" strike="noStrike">
-                <a:latin typeface="Arial"/>
-              </a:rPr>
-              <a:t>s</a:t>
-            </a:r>
-            <a:r>
-              <a:rPr b="0" lang="en-IN" sz="2800" spc="-1" strike="noStrike">
-                <a:latin typeface="Arial"/>
-              </a:rPr>
-              <a:t>h</a:t>
-            </a:r>
-            <a:r>
-              <a:rPr b="0" lang="en-IN" sz="2800" spc="-1" strike="noStrike">
-                <a:latin typeface="Arial"/>
-              </a:rPr>
-              <a:t>b</a:t>
-            </a:r>
-            <a:r>
-              <a:rPr b="0" lang="en-IN" sz="2800" spc="-1" strike="noStrike">
-                <a:latin typeface="Arial"/>
-              </a:rPr>
-              <a:t>o</a:t>
-            </a:r>
-            <a:r>
-              <a:rPr b="0" lang="en-IN" sz="2800" spc="-1" strike="noStrike">
-                <a:latin typeface="Arial"/>
-              </a:rPr>
-              <a:t>a</a:t>
-            </a:r>
-            <a:r>
-              <a:rPr b="0" lang="en-IN" sz="2800" spc="-1" strike="noStrike">
-                <a:latin typeface="Arial"/>
-              </a:rPr>
-              <a:t>r</a:t>
-            </a:r>
-            <a:r>
-              <a:rPr b="0" lang="en-IN" sz="2800" spc="-1" strike="noStrike">
-                <a:latin typeface="Arial"/>
-              </a:rPr>
-              <a:t>d</a:t>
-            </a:r>
-            <a:r>
-              <a:rPr b="0" lang="en-IN" sz="2800" spc="-1" strike="noStrike">
-                <a:latin typeface="Arial"/>
-              </a:rPr>
-              <a:t> </a:t>
-            </a:r>
-            <a:r>
-              <a:rPr b="0" lang="en-IN" sz="2800" spc="-1" strike="noStrike">
-                <a:latin typeface="Arial"/>
-              </a:rPr>
-              <a:t>w</a:t>
-            </a:r>
-            <a:r>
-              <a:rPr b="0" lang="en-IN" sz="2800" spc="-1" strike="noStrike">
-                <a:latin typeface="Arial"/>
-              </a:rPr>
-              <a:t>h</a:t>
-            </a:r>
-            <a:r>
-              <a:rPr b="0" lang="en-IN" sz="2800" spc="-1" strike="noStrike">
-                <a:latin typeface="Arial"/>
-              </a:rPr>
-              <a:t>i</a:t>
-            </a:r>
-            <a:r>
-              <a:rPr b="0" lang="en-IN" sz="2800" spc="-1" strike="noStrike">
-                <a:latin typeface="Arial"/>
-              </a:rPr>
-              <a:t>c</a:t>
-            </a:r>
-            <a:r>
-              <a:rPr b="0" lang="en-IN" sz="2800" spc="-1" strike="noStrike">
-                <a:latin typeface="Arial"/>
-              </a:rPr>
-              <a:t>h</a:t>
-            </a:r>
-            <a:r>
-              <a:rPr b="0" lang="en-IN" sz="2800" spc="-1" strike="noStrike">
-                <a:latin typeface="Arial"/>
-              </a:rPr>
-              <a:t> </a:t>
-            </a:r>
-            <a:r>
-              <a:rPr b="0" lang="en-IN" sz="2800" spc="-1" strike="noStrike">
-                <a:latin typeface="Arial"/>
-              </a:rPr>
-              <a:t>l</a:t>
-            </a:r>
-            <a:r>
-              <a:rPr b="0" lang="en-IN" sz="2800" spc="-1" strike="noStrike">
-                <a:latin typeface="Arial"/>
-              </a:rPr>
-              <a:t>e</a:t>
-            </a:r>
-            <a:r>
-              <a:rPr b="0" lang="en-IN" sz="2800" spc="-1" strike="noStrike">
-                <a:latin typeface="Arial"/>
-              </a:rPr>
-              <a:t>t</a:t>
-            </a:r>
-            <a:r>
-              <a:rPr b="0" lang="en-IN" sz="2800" spc="-1" strike="noStrike">
-                <a:latin typeface="Arial"/>
-              </a:rPr>
-              <a:t>s</a:t>
-            </a:r>
-            <a:r>
-              <a:rPr b="0" lang="en-IN" sz="2800" spc="-1" strike="noStrike">
-                <a:latin typeface="Arial"/>
-              </a:rPr>
-              <a:t> </a:t>
-            </a:r>
-            <a:r>
-              <a:rPr b="0" lang="en-IN" sz="2800" spc="-1" strike="noStrike">
-                <a:latin typeface="Arial"/>
-              </a:rPr>
-              <a:t>t</a:t>
-            </a:r>
-            <a:r>
-              <a:rPr b="0" lang="en-IN" sz="2800" spc="-1" strike="noStrike">
-                <a:latin typeface="Arial"/>
-              </a:rPr>
-              <a:t>o</a:t>
-            </a:r>
-            <a:r>
-              <a:rPr b="0" lang="en-IN" sz="2800" spc="-1" strike="noStrike">
-                <a:latin typeface="Arial"/>
-              </a:rPr>
-              <a:t> </a:t>
-            </a:r>
-            <a:r>
-              <a:rPr b="0" lang="en-IN" sz="2800" spc="-1" strike="noStrike">
-                <a:latin typeface="Arial"/>
-              </a:rPr>
-              <a:t>c</a:t>
-            </a:r>
-            <a:r>
-              <a:rPr b="0" lang="en-IN" sz="2800" spc="-1" strike="noStrike">
-                <a:latin typeface="Arial"/>
-              </a:rPr>
-              <a:t>h</a:t>
-            </a:r>
-            <a:r>
-              <a:rPr b="0" lang="en-IN" sz="2800" spc="-1" strike="noStrike">
-                <a:latin typeface="Arial"/>
-              </a:rPr>
-              <a:t>e</a:t>
-            </a:r>
-            <a:r>
-              <a:rPr b="0" lang="en-IN" sz="2800" spc="-1" strike="noStrike">
-                <a:latin typeface="Arial"/>
-              </a:rPr>
-              <a:t>c</a:t>
-            </a:r>
-            <a:r>
-              <a:rPr b="0" lang="en-IN" sz="2800" spc="-1" strike="noStrike">
-                <a:latin typeface="Arial"/>
-              </a:rPr>
-              <a:t>k</a:t>
-            </a:r>
-            <a:r>
-              <a:rPr b="0" lang="en-IN" sz="2800" spc="-1" strike="noStrike">
-                <a:latin typeface="Arial"/>
-              </a:rPr>
-              <a:t> </a:t>
-            </a:r>
-            <a:r>
-              <a:rPr b="0" lang="en-IN" sz="2800" spc="-1" strike="noStrike">
-                <a:latin typeface="Arial"/>
-              </a:rPr>
-              <a:t>t</a:t>
-            </a:r>
-            <a:r>
-              <a:rPr b="0" lang="en-IN" sz="2800" spc="-1" strike="noStrike">
-                <a:latin typeface="Arial"/>
-              </a:rPr>
-              <a:t>h</a:t>
-            </a:r>
-            <a:r>
-              <a:rPr b="0" lang="en-IN" sz="2800" spc="-1" strike="noStrike">
-                <a:latin typeface="Arial"/>
-              </a:rPr>
-              <a:t>e</a:t>
-            </a:r>
-            <a:r>
-              <a:rPr b="0" lang="en-IN" sz="2800" spc="-1" strike="noStrike">
-                <a:latin typeface="Arial"/>
-              </a:rPr>
-              <a:t> </a:t>
-            </a:r>
-            <a:r>
-              <a:rPr b="0" lang="en-IN" sz="2800" spc="-1" strike="noStrike">
-                <a:latin typeface="Arial"/>
-              </a:rPr>
-              <a:t>C</a:t>
-            </a:r>
-            <a:r>
-              <a:rPr b="0" lang="en-IN" sz="2800" spc="-1" strike="noStrike">
-                <a:latin typeface="Arial"/>
-              </a:rPr>
-              <a:t>P</a:t>
-            </a:r>
-            <a:r>
-              <a:rPr b="0" lang="en-IN" sz="2800" spc="-1" strike="noStrike">
-                <a:latin typeface="Arial"/>
-              </a:rPr>
-              <a:t>U</a:t>
-            </a:r>
-            <a:r>
-              <a:rPr b="0" lang="en-IN" sz="2800" spc="-1" strike="noStrike">
-                <a:latin typeface="Arial"/>
-              </a:rPr>
-              <a:t> </a:t>
-            </a:r>
-            <a:r>
-              <a:rPr b="0" lang="en-IN" sz="2800" spc="-1" strike="noStrike">
-                <a:latin typeface="Arial"/>
-              </a:rPr>
-              <a:t>U</a:t>
-            </a:r>
-            <a:r>
-              <a:rPr b="0" lang="en-IN" sz="2800" spc="-1" strike="noStrike">
-                <a:latin typeface="Arial"/>
-              </a:rPr>
-              <a:t>t</a:t>
-            </a:r>
-            <a:r>
-              <a:rPr b="0" lang="en-IN" sz="2800" spc="-1" strike="noStrike">
-                <a:latin typeface="Arial"/>
-              </a:rPr>
-              <a:t>i</a:t>
-            </a:r>
-            <a:r>
-              <a:rPr b="0" lang="en-IN" sz="2800" spc="-1" strike="noStrike">
-                <a:latin typeface="Arial"/>
-              </a:rPr>
-              <a:t>l</a:t>
-            </a:r>
-            <a:r>
-              <a:rPr b="0" lang="en-IN" sz="2800" spc="-1" strike="noStrike">
-                <a:latin typeface="Arial"/>
-              </a:rPr>
-              <a:t>i</a:t>
-            </a:r>
-            <a:r>
-              <a:rPr b="0" lang="en-IN" sz="2800" spc="-1" strike="noStrike">
-                <a:latin typeface="Arial"/>
-              </a:rPr>
-              <a:t>z</a:t>
-            </a:r>
-            <a:r>
-              <a:rPr b="0" lang="en-IN" sz="2800" spc="-1" strike="noStrike">
-                <a:latin typeface="Arial"/>
-              </a:rPr>
-              <a:t>a</a:t>
-            </a:r>
-            <a:r>
-              <a:rPr b="0" lang="en-IN" sz="2800" spc="-1" strike="noStrike">
-                <a:latin typeface="Arial"/>
-              </a:rPr>
-              <a:t>t</a:t>
-            </a:r>
-            <a:r>
-              <a:rPr b="0" lang="en-IN" sz="2800" spc="-1" strike="noStrike">
-                <a:latin typeface="Arial"/>
-              </a:rPr>
-              <a:t>i</a:t>
-            </a:r>
-            <a:r>
-              <a:rPr b="0" lang="en-IN" sz="2800" spc="-1" strike="noStrike">
-                <a:latin typeface="Arial"/>
-              </a:rPr>
-              <a:t>o</a:t>
-            </a:r>
-            <a:r>
-              <a:rPr b="0" lang="en-IN" sz="2800" spc="-1" strike="noStrike">
-                <a:latin typeface="Arial"/>
-              </a:rPr>
-              <a:t>n</a:t>
-            </a:r>
-            <a:r>
-              <a:rPr b="0" lang="en-IN" sz="2800" spc="-1" strike="noStrike">
-                <a:latin typeface="Arial"/>
-              </a:rPr>
-              <a:t> </a:t>
-            </a:r>
-            <a:r>
-              <a:rPr b="0" lang="en-IN" sz="2800" spc="-1" strike="noStrike">
-                <a:latin typeface="Arial"/>
-              </a:rPr>
-              <a:t>a</a:t>
-            </a:r>
-            <a:r>
-              <a:rPr b="0" lang="en-IN" sz="2800" spc="-1" strike="noStrike">
-                <a:latin typeface="Arial"/>
-              </a:rPr>
-              <a:t>n</a:t>
-            </a:r>
-            <a:r>
-              <a:rPr b="0" lang="en-IN" sz="2800" spc="-1" strike="noStrike">
-                <a:latin typeface="Arial"/>
-              </a:rPr>
-              <a:t>d</a:t>
-            </a:r>
-            <a:r>
-              <a:rPr b="0" lang="en-IN" sz="2800" spc="-1" strike="noStrike">
-                <a:latin typeface="Arial"/>
-              </a:rPr>
-              <a:t> </a:t>
-            </a:r>
-            <a:r>
-              <a:rPr b="0" lang="en-IN" sz="2800" spc="-1" strike="noStrike">
-                <a:latin typeface="Arial"/>
-              </a:rPr>
-              <a:t>N</a:t>
-            </a:r>
-            <a:r>
-              <a:rPr b="0" lang="en-IN" sz="2800" spc="-1" strike="noStrike">
-                <a:latin typeface="Arial"/>
-              </a:rPr>
-              <a:t>e</a:t>
-            </a:r>
-            <a:r>
-              <a:rPr b="0" lang="en-IN" sz="2800" spc="-1" strike="noStrike">
-                <a:latin typeface="Arial"/>
-              </a:rPr>
-              <a:t>t</a:t>
-            </a:r>
-            <a:r>
-              <a:rPr b="0" lang="en-IN" sz="2800" spc="-1" strike="noStrike">
-                <a:latin typeface="Arial"/>
-              </a:rPr>
-              <a:t>w</a:t>
-            </a:r>
-            <a:r>
-              <a:rPr b="0" lang="en-IN" sz="2800" spc="-1" strike="noStrike">
-                <a:latin typeface="Arial"/>
-              </a:rPr>
-              <a:t>o</a:t>
-            </a:r>
-            <a:r>
-              <a:rPr b="0" lang="en-IN" sz="2800" spc="-1" strike="noStrike">
-                <a:latin typeface="Arial"/>
-              </a:rPr>
-              <a:t>r</a:t>
-            </a:r>
-            <a:r>
-              <a:rPr b="0" lang="en-IN" sz="2800" spc="-1" strike="noStrike">
-                <a:latin typeface="Arial"/>
-              </a:rPr>
-              <a:t>k</a:t>
-            </a:r>
-            <a:r>
-              <a:rPr b="0" lang="en-IN" sz="2800" spc="-1" strike="noStrike">
-                <a:latin typeface="Arial"/>
-              </a:rPr>
-              <a:t>I</a:t>
-            </a:r>
-            <a:r>
-              <a:rPr b="0" lang="en-IN" sz="2800" spc="-1" strike="noStrike">
-                <a:latin typeface="Arial"/>
-              </a:rPr>
-              <a:t>n</a:t>
-            </a:r>
-            <a:r>
-              <a:rPr b="0" lang="en-IN" sz="2800" spc="-1" strike="noStrike">
-                <a:latin typeface="Arial"/>
-              </a:rPr>
-              <a:t> </a:t>
-            </a:r>
-            <a:r>
-              <a:rPr b="0" lang="en-IN" sz="2800" spc="-1" strike="noStrike">
-                <a:latin typeface="Arial"/>
-              </a:rPr>
-              <a:t>f</a:t>
-            </a:r>
-            <a:r>
-              <a:rPr b="0" lang="en-IN" sz="2800" spc="-1" strike="noStrike">
-                <a:latin typeface="Arial"/>
-              </a:rPr>
-              <a:t>o</a:t>
-            </a:r>
-            <a:r>
-              <a:rPr b="0" lang="en-IN" sz="2800" spc="-1" strike="noStrike">
-                <a:latin typeface="Arial"/>
-              </a:rPr>
-              <a:t>r</a:t>
-            </a:r>
-            <a:r>
-              <a:rPr b="0" lang="en-IN" sz="2800" spc="-1" strike="noStrike">
-                <a:latin typeface="Arial"/>
-              </a:rPr>
-              <a:t> </a:t>
-            </a:r>
-            <a:r>
-              <a:rPr b="0" lang="en-IN" sz="2800" spc="-1" strike="noStrike">
-                <a:latin typeface="Arial"/>
-              </a:rPr>
-              <a:t>a</a:t>
-            </a:r>
-            <a:r>
-              <a:rPr b="0" lang="en-IN" sz="2800" spc="-1" strike="noStrike">
-                <a:latin typeface="Arial"/>
-              </a:rPr>
-              <a:t> </a:t>
-            </a:r>
-            <a:r>
-              <a:rPr b="0" lang="en-IN" sz="2800" spc="-1" strike="noStrike">
-                <a:latin typeface="Arial"/>
-              </a:rPr>
-              <a:t>p</a:t>
-            </a:r>
-            <a:r>
-              <a:rPr b="0" lang="en-IN" sz="2800" spc="-1" strike="noStrike">
-                <a:latin typeface="Arial"/>
-              </a:rPr>
-              <a:t>a</a:t>
-            </a:r>
-            <a:r>
-              <a:rPr b="0" lang="en-IN" sz="2800" spc="-1" strike="noStrike">
-                <a:latin typeface="Arial"/>
-              </a:rPr>
-              <a:t>r</a:t>
-            </a:r>
-            <a:r>
-              <a:rPr b="0" lang="en-IN" sz="2800" spc="-1" strike="noStrike">
-                <a:latin typeface="Arial"/>
-              </a:rPr>
-              <a:t>t</a:t>
-            </a:r>
-            <a:r>
-              <a:rPr b="0" lang="en-IN" sz="2800" spc="-1" strike="noStrike">
-                <a:latin typeface="Arial"/>
-              </a:rPr>
-              <a:t>i</a:t>
-            </a:r>
-            <a:r>
-              <a:rPr b="0" lang="en-IN" sz="2800" spc="-1" strike="noStrike">
-                <a:latin typeface="Arial"/>
-              </a:rPr>
-              <a:t>c</a:t>
-            </a:r>
-            <a:r>
-              <a:rPr b="0" lang="en-IN" sz="2800" spc="-1" strike="noStrike">
-                <a:latin typeface="Arial"/>
-              </a:rPr>
-              <a:t>u</a:t>
-            </a:r>
-            <a:r>
-              <a:rPr b="0" lang="en-IN" sz="2800" spc="-1" strike="noStrike">
-                <a:latin typeface="Arial"/>
-              </a:rPr>
-              <a:t>l</a:t>
-            </a:r>
-            <a:r>
-              <a:rPr b="0" lang="en-IN" sz="2800" spc="-1" strike="noStrike">
-                <a:latin typeface="Arial"/>
-              </a:rPr>
-              <a:t>a</a:t>
-            </a:r>
-            <a:r>
-              <a:rPr b="0" lang="en-IN" sz="2800" spc="-1" strike="noStrike">
-                <a:latin typeface="Arial"/>
-              </a:rPr>
-              <a:t>r</a:t>
-            </a:r>
-            <a:r>
-              <a:rPr b="0" lang="en-IN" sz="2800" spc="-1" strike="noStrike">
-                <a:latin typeface="Arial"/>
-              </a:rPr>
-              <a:t> </a:t>
-            </a:r>
-            <a:r>
-              <a:rPr b="0" lang="en-IN" sz="2800" spc="-1" strike="noStrike">
-                <a:latin typeface="Arial"/>
-              </a:rPr>
-              <a:t>E</a:t>
-            </a:r>
-            <a:r>
-              <a:rPr b="0" lang="en-IN" sz="2800" spc="-1" strike="noStrike">
-                <a:latin typeface="Arial"/>
-              </a:rPr>
-              <a:t>C</a:t>
-            </a:r>
-            <a:r>
-              <a:rPr b="0" lang="en-IN" sz="2800" spc="-1" strike="noStrike">
-                <a:latin typeface="Arial"/>
-              </a:rPr>
-              <a:t>2</a:t>
-            </a:r>
-            <a:r>
-              <a:rPr b="0" lang="en-IN" sz="2800" spc="-1" strike="noStrike">
-                <a:latin typeface="Arial"/>
-              </a:rPr>
-              <a:t> </a:t>
-            </a:r>
-            <a:r>
-              <a:rPr b="0" lang="en-IN" sz="2800" spc="-1" strike="noStrike">
-                <a:latin typeface="Arial"/>
-              </a:rPr>
-              <a:t>i</a:t>
-            </a:r>
-            <a:r>
-              <a:rPr b="0" lang="en-IN" sz="2800" spc="-1" strike="noStrike">
-                <a:latin typeface="Arial"/>
-              </a:rPr>
-              <a:t>n</a:t>
-            </a:r>
-            <a:r>
-              <a:rPr b="0" lang="en-IN" sz="2800" spc="-1" strike="noStrike">
-                <a:latin typeface="Arial"/>
-              </a:rPr>
-              <a:t>s</a:t>
-            </a:r>
-            <a:r>
-              <a:rPr b="0" lang="en-IN" sz="2800" spc="-1" strike="noStrike">
-                <a:latin typeface="Arial"/>
-              </a:rPr>
-              <a:t>t</a:t>
-            </a:r>
-            <a:r>
-              <a:rPr b="0" lang="en-IN" sz="2800" spc="-1" strike="noStrike">
-                <a:latin typeface="Arial"/>
-              </a:rPr>
-              <a:t>a</a:t>
-            </a:r>
-            <a:r>
-              <a:rPr b="0" lang="en-IN" sz="2800" spc="-1" strike="noStrike">
-                <a:latin typeface="Arial"/>
-              </a:rPr>
-              <a:t>n</a:t>
-            </a:r>
-            <a:r>
-              <a:rPr b="0" lang="en-IN" sz="2800" spc="-1" strike="noStrike">
-                <a:latin typeface="Arial"/>
-              </a:rPr>
-              <a:t>c</a:t>
-            </a:r>
-            <a:r>
-              <a:rPr b="0" lang="en-IN" sz="2800" spc="-1" strike="noStrike">
-                <a:latin typeface="Arial"/>
-              </a:rPr>
-              <a:t>e</a:t>
+              <a:t>Create a dashboard which lets to check the CPU Utilization and NetworkIn for a particular EC2 instance</a:t>
             </a:r>
             <a:endParaRPr b="0" lang="en-IN" sz="2800" spc="-1" strike="noStrike">
               <a:latin typeface="Arial"/>
@@ -4821,7 +3724,7 @@
         <p:spPr>
           <a:xfrm>
             <a:off x="0" y="3932640"/>
-            <a:ext cx="4590720" cy="1647360"/>
+            <a:ext cx="4590360" cy="1647000"/>
           </a:xfrm>
           <a:prstGeom prst="rect">
             <a:avLst/>
@@ -4846,7 +3749,7 @@
         <p:spPr>
           <a:xfrm>
             <a:off x="6840000" y="21960"/>
-            <a:ext cx="3240720" cy="2953080"/>
+            <a:ext cx="3240360" cy="2952720"/>
           </a:xfrm>
           <a:prstGeom prst="rect">
             <a:avLst/>
@@ -4869,7 +3772,7 @@
         <p:spPr>
           <a:xfrm>
             <a:off x="0" y="0"/>
-            <a:ext cx="5040000" cy="2450160"/>
+            <a:ext cx="5039640" cy="2449800"/>
           </a:xfrm>
           <a:prstGeom prst="rect">
             <a:avLst/>
@@ -4890,7 +3793,7 @@
         <p:spPr>
           <a:xfrm>
             <a:off x="4356000" y="1152000"/>
-            <a:ext cx="646560" cy="538560"/>
+            <a:ext cx="646200" cy="538200"/>
           </a:xfrm>
           <a:prstGeom prst="ellipse">
             <a:avLst/>
@@ -4945,7 +3848,7 @@
         <p:spPr>
           <a:xfrm>
             <a:off x="5400000" y="4140000"/>
-            <a:ext cx="4569840" cy="1438560"/>
+            <a:ext cx="4569480" cy="1438200"/>
           </a:xfrm>
           <a:prstGeom prst="rect">
             <a:avLst/>
@@ -5080,7 +3983,7 @@
         <p:spPr>
           <a:xfrm>
             <a:off x="7740000" y="540000"/>
-            <a:ext cx="646560" cy="538560"/>
+            <a:ext cx="646200" cy="538200"/>
           </a:xfrm>
           <a:prstGeom prst="ellipse">
             <a:avLst/>
@@ -5139,7 +4042,7 @@
         <p:spPr>
           <a:xfrm>
             <a:off x="0" y="2520000"/>
-            <a:ext cx="5370840" cy="1260000"/>
+            <a:ext cx="5370480" cy="1259640"/>
           </a:xfrm>
           <a:prstGeom prst="rect">
             <a:avLst/>
@@ -5160,7 +4063,7 @@
         <p:spPr>
           <a:xfrm>
             <a:off x="4680000" y="3240000"/>
-            <a:ext cx="646560" cy="538560"/>
+            <a:ext cx="646200" cy="538200"/>
           </a:xfrm>
           <a:prstGeom prst="ellipse">
             <a:avLst/>
@@ -5215,7 +4118,7 @@
         <p:spPr>
           <a:xfrm>
             <a:off x="1800000" y="4140000"/>
-            <a:ext cx="646560" cy="538560"/>
+            <a:ext cx="646200" cy="538200"/>
           </a:xfrm>
           <a:prstGeom prst="ellipse">
             <a:avLst/>
@@ -5304,7 +4207,7 @@
         <p:spPr>
           <a:xfrm>
             <a:off x="42480" y="35280"/>
-            <a:ext cx="4457520" cy="1641960"/>
+            <a:ext cx="4457160" cy="1641600"/>
           </a:xfrm>
           <a:prstGeom prst="rect">
             <a:avLst/>
@@ -5325,7 +4228,7 @@
         <p:spPr>
           <a:xfrm>
             <a:off x="1657440" y="829440"/>
-            <a:ext cx="646560" cy="538560"/>
+            <a:ext cx="646200" cy="538200"/>
           </a:xfrm>
           <a:prstGeom prst="ellipse">
             <a:avLst/>
@@ -5380,7 +4283,7 @@
         <p:spPr>
           <a:xfrm>
             <a:off x="7700040" y="3312000"/>
-            <a:ext cx="2377800" cy="2358720"/>
+            <a:ext cx="2377440" cy="2358360"/>
           </a:xfrm>
           <a:prstGeom prst="rect">
             <a:avLst/>
@@ -5529,7 +4432,7 @@
         <p:spPr>
           <a:xfrm>
             <a:off x="4494600" y="35280"/>
-            <a:ext cx="5585760" cy="2304720"/>
+            <a:ext cx="5585400" cy="2304360"/>
           </a:xfrm>
           <a:prstGeom prst="rect">
             <a:avLst/>
@@ -5550,7 +4453,7 @@
         <p:spPr>
           <a:xfrm>
             <a:off x="5473440" y="901440"/>
-            <a:ext cx="646560" cy="538560"/>
+            <a:ext cx="646200" cy="538200"/>
           </a:xfrm>
           <a:prstGeom prst="ellipse">
             <a:avLst/>
@@ -5605,7 +4508,7 @@
         <p:spPr>
           <a:xfrm>
             <a:off x="9180000" y="288000"/>
-            <a:ext cx="646560" cy="538560"/>
+            <a:ext cx="646200" cy="538200"/>
           </a:xfrm>
           <a:prstGeom prst="ellipse">
             <a:avLst/>
@@ -5664,7 +4567,7 @@
         <p:spPr>
           <a:xfrm>
             <a:off x="360" y="2880000"/>
-            <a:ext cx="7591680" cy="2790720"/>
+            <a:ext cx="7591320" cy="2790360"/>
           </a:xfrm>
           <a:prstGeom prst="rect">
             <a:avLst/>
@@ -5685,7 +4588,7 @@
         <p:spPr>
           <a:xfrm>
             <a:off x="3960000" y="4860000"/>
-            <a:ext cx="646560" cy="538560"/>
+            <a:ext cx="646200" cy="538200"/>
           </a:xfrm>
           <a:prstGeom prst="ellipse">
             <a:avLst/>

</xml_diff>